<commit_message>
Excel_v2: formula changed, so it doesn't mix TypeOfCar with FuelType
</commit_message>
<xml_diff>
--- a/Gergo_Ferenczy/AfterTrainingExcercise/biz_mockup.pptx
+++ b/Gergo_Ferenczy/AfterTrainingExcercise/biz_mockup.pptx
@@ -9,6 +9,7 @@
     <p:sldId id="257" r:id="rId6"/>
     <p:sldId id="261" r:id="rId7"/>
     <p:sldId id="258" r:id="rId8"/>
+    <p:sldId id="262" r:id="rId9"/>
   </p:sldIdLst>
   <p:sldSz cx="12192000" cy="6858000"/>
   <p:notesSz cx="6858000" cy="9144000"/>
@@ -13538,7 +13539,7 @@
           <a:p>
             <a:fld id="{C6F274C7-220D-444C-A171-187D94A02CDD}" type="datetimeFigureOut">
               <a:rPr lang="en-US" smtClean="0"/>
-              <a:t>10/16/2019</a:t>
+              <a:t>10/18/2019</a:t>
             </a:fld>
             <a:endParaRPr lang="en-US"/>
           </a:p>
@@ -13736,7 +13737,7 @@
           <a:p>
             <a:fld id="{C6F274C7-220D-444C-A171-187D94A02CDD}" type="datetimeFigureOut">
               <a:rPr lang="en-US" smtClean="0"/>
-              <a:t>10/16/2019</a:t>
+              <a:t>10/18/2019</a:t>
             </a:fld>
             <a:endParaRPr lang="en-US"/>
           </a:p>
@@ -13944,7 +13945,7 @@
           <a:p>
             <a:fld id="{C6F274C7-220D-444C-A171-187D94A02CDD}" type="datetimeFigureOut">
               <a:rPr lang="en-US" smtClean="0"/>
-              <a:t>10/16/2019</a:t>
+              <a:t>10/18/2019</a:t>
             </a:fld>
             <a:endParaRPr lang="en-US"/>
           </a:p>
@@ -14142,7 +14143,7 @@
           <a:p>
             <a:fld id="{C6F274C7-220D-444C-A171-187D94A02CDD}" type="datetimeFigureOut">
               <a:rPr lang="en-US" smtClean="0"/>
-              <a:t>10/16/2019</a:t>
+              <a:t>10/18/2019</a:t>
             </a:fld>
             <a:endParaRPr lang="en-US"/>
           </a:p>
@@ -14417,7 +14418,7 @@
           <a:p>
             <a:fld id="{C6F274C7-220D-444C-A171-187D94A02CDD}" type="datetimeFigureOut">
               <a:rPr lang="en-US" smtClean="0"/>
-              <a:t>10/16/2019</a:t>
+              <a:t>10/18/2019</a:t>
             </a:fld>
             <a:endParaRPr lang="en-US"/>
           </a:p>
@@ -14682,7 +14683,7 @@
           <a:p>
             <a:fld id="{C6F274C7-220D-444C-A171-187D94A02CDD}" type="datetimeFigureOut">
               <a:rPr lang="en-US" smtClean="0"/>
-              <a:t>10/16/2019</a:t>
+              <a:t>10/18/2019</a:t>
             </a:fld>
             <a:endParaRPr lang="en-US"/>
           </a:p>
@@ -15094,7 +15095,7 @@
           <a:p>
             <a:fld id="{C6F274C7-220D-444C-A171-187D94A02CDD}" type="datetimeFigureOut">
               <a:rPr lang="en-US" smtClean="0"/>
-              <a:t>10/16/2019</a:t>
+              <a:t>10/18/2019</a:t>
             </a:fld>
             <a:endParaRPr lang="en-US"/>
           </a:p>
@@ -15235,7 +15236,7 @@
           <a:p>
             <a:fld id="{C6F274C7-220D-444C-A171-187D94A02CDD}" type="datetimeFigureOut">
               <a:rPr lang="en-US" smtClean="0"/>
-              <a:t>10/16/2019</a:t>
+              <a:t>10/18/2019</a:t>
             </a:fld>
             <a:endParaRPr lang="en-US"/>
           </a:p>
@@ -15348,7 +15349,7 @@
           <a:p>
             <a:fld id="{C6F274C7-220D-444C-A171-187D94A02CDD}" type="datetimeFigureOut">
               <a:rPr lang="en-US" smtClean="0"/>
-              <a:t>10/16/2019</a:t>
+              <a:t>10/18/2019</a:t>
             </a:fld>
             <a:endParaRPr lang="en-US"/>
           </a:p>
@@ -15659,7 +15660,7 @@
           <a:p>
             <a:fld id="{C6F274C7-220D-444C-A171-187D94A02CDD}" type="datetimeFigureOut">
               <a:rPr lang="en-US" smtClean="0"/>
-              <a:t>10/16/2019</a:t>
+              <a:t>10/18/2019</a:t>
             </a:fld>
             <a:endParaRPr lang="en-US"/>
           </a:p>
@@ -15947,7 +15948,7 @@
           <a:p>
             <a:fld id="{C6F274C7-220D-444C-A171-187D94A02CDD}" type="datetimeFigureOut">
               <a:rPr lang="en-US" smtClean="0"/>
-              <a:t>10/16/2019</a:t>
+              <a:t>10/18/2019</a:t>
             </a:fld>
             <a:endParaRPr lang="en-US"/>
           </a:p>
@@ -16188,7 +16189,7 @@
           <a:p>
             <a:fld id="{C6F274C7-220D-444C-A171-187D94A02CDD}" type="datetimeFigureOut">
               <a:rPr lang="en-US" smtClean="0"/>
-              <a:t>10/16/2019</a:t>
+              <a:t>10/18/2019</a:t>
             </a:fld>
             <a:endParaRPr lang="en-US"/>
           </a:p>
@@ -19049,10 +19050,10 @@
           <a:p>
             <a:pPr algn="ctr"/>
             <a:r>
-              <a:rPr lang="hu-HU" sz="1200"/>
+              <a:rPr lang="hu-HU" sz="1200" dirty="0"/>
               <a:t>&lt; Home</a:t>
             </a:r>
-            <a:endParaRPr lang="en-US" sz="1200"/>
+            <a:endParaRPr lang="en-US" sz="1200" dirty="0"/>
           </a:p>
         </p:txBody>
       </p:sp>
@@ -19189,90 +19190,177 @@
               <a:buChar char="ü"/>
             </a:pPr>
             <a:r>
-              <a:rPr lang="hu-HU"/>
-              <a:t>Congratulations!</a:t>
+              <a:rPr lang="hu-HU" dirty="0" err="1"/>
+              <a:t>Congratulations</a:t>
+            </a:r>
+            <a:r>
+              <a:rPr lang="hu-HU" dirty="0"/>
+              <a:t>!</a:t>
             </a:r>
           </a:p>
           <a:p>
             <a:r>
-              <a:rPr lang="hu-HU"/>
-              <a:t>You have successfully issued a quote.</a:t>
+              <a:rPr lang="hu-HU" dirty="0" err="1"/>
+              <a:t>You</a:t>
+            </a:r>
+            <a:r>
+              <a:rPr lang="hu-HU" dirty="0"/>
+              <a:t> </a:t>
+            </a:r>
+            <a:r>
+              <a:rPr lang="hu-HU" dirty="0" err="1"/>
+              <a:t>have</a:t>
+            </a:r>
+            <a:r>
+              <a:rPr lang="hu-HU" dirty="0"/>
+              <a:t> </a:t>
+            </a:r>
+            <a:r>
+              <a:rPr lang="hu-HU" dirty="0" err="1"/>
+              <a:t>successfully</a:t>
+            </a:r>
+            <a:r>
+              <a:rPr lang="hu-HU" dirty="0"/>
+              <a:t> </a:t>
+            </a:r>
+            <a:r>
+              <a:rPr lang="hu-HU" dirty="0" err="1"/>
+              <a:t>issued</a:t>
+            </a:r>
+            <a:r>
+              <a:rPr lang="hu-HU" dirty="0"/>
+              <a:t> a </a:t>
+            </a:r>
+            <a:r>
+              <a:rPr lang="hu-HU" dirty="0" err="1"/>
+              <a:t>quote</a:t>
+            </a:r>
+            <a:r>
+              <a:rPr lang="hu-HU" dirty="0"/>
+              <a:t>.</a:t>
             </a:r>
           </a:p>
           <a:p>
-            <a:endParaRPr lang="hu-HU"/>
+            <a:endParaRPr lang="hu-HU" dirty="0"/>
           </a:p>
           <a:p>
             <a:r>
-              <a:rPr lang="hu-HU"/>
-              <a:t>First name: </a:t>
+              <a:rPr lang="hu-HU" dirty="0" err="1"/>
+              <a:t>First</a:t>
             </a:r>
             <a:r>
-              <a:rPr lang="hu-HU" b="1"/>
+              <a:rPr lang="hu-HU" dirty="0"/>
+              <a:t> </a:t>
+            </a:r>
+            <a:r>
+              <a:rPr lang="hu-HU" dirty="0" err="1"/>
+              <a:t>name</a:t>
+            </a:r>
+            <a:r>
+              <a:rPr lang="hu-HU" dirty="0"/>
+              <a:t>: </a:t>
+            </a:r>
+            <a:r>
+              <a:rPr lang="hu-HU" b="1" dirty="0"/>
               <a:t>John</a:t>
             </a:r>
             <a:r>
-              <a:rPr lang="hu-HU"/>
-              <a:t>          Last name: </a:t>
+              <a:rPr lang="hu-HU" dirty="0"/>
+              <a:t>          Last </a:t>
             </a:r>
             <a:r>
-              <a:rPr lang="hu-HU" b="1"/>
+              <a:rPr lang="hu-HU" dirty="0" err="1"/>
+              <a:t>name</a:t>
+            </a:r>
+            <a:r>
+              <a:rPr lang="hu-HU" dirty="0"/>
+              <a:t>: </a:t>
+            </a:r>
+            <a:r>
+              <a:rPr lang="hu-HU" b="1" dirty="0" err="1"/>
               <a:t>Doe</a:t>
             </a:r>
+            <a:endParaRPr lang="hu-HU" b="1" dirty="0"/>
           </a:p>
           <a:p>
             <a:r>
-              <a:rPr lang="hu-HU"/>
-              <a:t>Age: </a:t>
+              <a:rPr lang="hu-HU" dirty="0" err="1"/>
+              <a:t>Age</a:t>
             </a:r>
             <a:r>
-              <a:rPr lang="hu-HU" b="1"/>
+              <a:rPr lang="hu-HU" dirty="0"/>
+              <a:t>: </a:t>
+            </a:r>
+            <a:r>
+              <a:rPr lang="hu-HU" b="1" dirty="0"/>
               <a:t>41</a:t>
             </a:r>
             <a:r>
-              <a:rPr lang="hu-HU"/>
-              <a:t>                          Nationality: </a:t>
+              <a:rPr lang="hu-HU" dirty="0"/>
+              <a:t>                          </a:t>
             </a:r>
             <a:r>
-              <a:rPr lang="hu-HU" b="1"/>
+              <a:rPr lang="hu-HU" dirty="0" err="1"/>
+              <a:t>Nationality</a:t>
+            </a:r>
+            <a:r>
+              <a:rPr lang="hu-HU" dirty="0"/>
+              <a:t>: </a:t>
+            </a:r>
+            <a:r>
+              <a:rPr lang="hu-HU" b="1" dirty="0" err="1"/>
               <a:t>Hungarian</a:t>
             </a:r>
+            <a:endParaRPr lang="hu-HU" b="1" dirty="0"/>
           </a:p>
           <a:p>
             <a:r>
-              <a:rPr lang="hu-HU"/>
-              <a:t>Address: </a:t>
+              <a:rPr lang="hu-HU" dirty="0" err="1"/>
+              <a:t>Address</a:t>
             </a:r>
             <a:r>
-              <a:rPr lang="hu-HU" i="1"/>
+              <a:rPr lang="hu-HU" dirty="0"/>
+              <a:t>: </a:t>
+            </a:r>
+            <a:r>
+              <a:rPr lang="hu-HU" i="1" dirty="0"/>
               <a:t>Bocskai 201, 1132</a:t>
             </a:r>
           </a:p>
           <a:p>
-            <a:endParaRPr lang="hu-HU"/>
+            <a:endParaRPr lang="hu-HU" dirty="0"/>
           </a:p>
           <a:p>
             <a:r>
-              <a:rPr lang="hu-HU"/>
-              <a:t>Package: </a:t>
+              <a:rPr lang="hu-HU" dirty="0" err="1"/>
+              <a:t>Package</a:t>
             </a:r>
             <a:r>
-              <a:rPr lang="hu-HU" b="1"/>
-              <a:t>Premium Light</a:t>
+              <a:rPr lang="hu-HU" dirty="0"/>
+              <a:t>: </a:t>
             </a:r>
+            <a:r>
+              <a:rPr lang="hu-HU" b="1" dirty="0"/>
+              <a:t>Premium </a:t>
+            </a:r>
+            <a:r>
+              <a:rPr lang="hu-HU" b="1" dirty="0" err="1"/>
+              <a:t>Light</a:t>
+            </a:r>
+            <a:endParaRPr lang="hu-HU" b="1" dirty="0"/>
           </a:p>
           <a:p>
             <a:r>
-              <a:rPr lang="hu-HU"/>
+              <a:rPr lang="hu-HU" dirty="0"/>
               <a:t>Premium: </a:t>
             </a:r>
             <a:r>
-              <a:rPr lang="hu-HU" b="1"/>
+              <a:rPr lang="hu-HU" b="1" dirty="0"/>
               <a:t>$ 7,560</a:t>
             </a:r>
           </a:p>
           <a:p>
-            <a:endParaRPr lang="hu-HU"/>
+            <a:endParaRPr lang="hu-HU" dirty="0"/>
           </a:p>
         </p:txBody>
       </p:sp>
@@ -19280,6 +19368,142 @@
     <p:extLst>
       <p:ext uri="{BB962C8B-B14F-4D97-AF65-F5344CB8AC3E}">
         <p14:creationId xmlns:p14="http://schemas.microsoft.com/office/powerpoint/2010/main" val="2791642231"/>
+      </p:ext>
+    </p:extLst>
+  </p:cSld>
+  <p:clrMapOvr>
+    <a:masterClrMapping/>
+  </p:clrMapOvr>
+</p:sld>
+</file>
+
+<file path=ppt/slides/slide5.xml><?xml version="1.0" encoding="utf-8"?>
+<p:sld xmlns:a="http://schemas.openxmlformats.org/drawingml/2006/main" xmlns:r="http://schemas.openxmlformats.org/officeDocument/2006/relationships" xmlns:p="http://schemas.openxmlformats.org/presentationml/2006/main">
+  <p:cSld>
+    <p:spTree>
+      <p:nvGrpSpPr>
+        <p:cNvPr id="1" name=""/>
+        <p:cNvGrpSpPr/>
+        <p:nvPr/>
+      </p:nvGrpSpPr>
+      <p:grpSpPr>
+        <a:xfrm>
+          <a:off x="0" y="0"/>
+          <a:ext cx="0" cy="0"/>
+          <a:chOff x="0" y="0"/>
+          <a:chExt cx="0" cy="0"/>
+        </a:xfrm>
+      </p:grpSpPr>
+      <p:sp>
+        <p:nvSpPr>
+          <p:cNvPr id="8" name="TextBox 7">
+            <a:extLst>
+              <a:ext uri="{FF2B5EF4-FFF2-40B4-BE49-F238E27FC236}">
+                <a16:creationId xmlns:a16="http://schemas.microsoft.com/office/drawing/2014/main" id="{5E7C0490-50F8-48D8-8722-DCB885F8A4B0}"/>
+              </a:ext>
+            </a:extLst>
+          </p:cNvPr>
+          <p:cNvSpPr txBox="1"/>
+          <p:nvPr/>
+        </p:nvSpPr>
+        <p:spPr>
+          <a:xfrm>
+            <a:off x="3256767" y="1290181"/>
+            <a:ext cx="914400" cy="914400"/>
+          </a:xfrm>
+          <a:prstGeom prst="rect">
+            <a:avLst/>
+          </a:prstGeom>
+          <a:solidFill>
+            <a:schemeClr val="accent2"/>
+          </a:solidFill>
+        </p:spPr>
+        <p:txBody>
+          <a:bodyPr wrap="square" rtlCol="0" anchor="ctr">
+            <a:noAutofit/>
+          </a:bodyPr>
+          <a:lstStyle/>
+          <a:p>
+            <a:pPr algn="ctr"/>
+            <a:r>
+              <a:rPr lang="en-US" dirty="0"/>
+              <a:t>NEW</a:t>
+            </a:r>
+          </a:p>
+        </p:txBody>
+      </p:sp>
+      <p:sp>
+        <p:nvSpPr>
+          <p:cNvPr id="9" name="TextBox 8">
+            <a:extLst>
+              <a:ext uri="{FF2B5EF4-FFF2-40B4-BE49-F238E27FC236}">
+                <a16:creationId xmlns:a16="http://schemas.microsoft.com/office/drawing/2014/main" id="{B12395BF-61BC-4F1B-8C44-3D7BCE7565C6}"/>
+              </a:ext>
+            </a:extLst>
+          </p:cNvPr>
+          <p:cNvSpPr txBox="1"/>
+          <p:nvPr/>
+        </p:nvSpPr>
+        <p:spPr>
+          <a:xfrm>
+            <a:off x="4654307" y="2395892"/>
+            <a:ext cx="914400" cy="914400"/>
+          </a:xfrm>
+          <a:prstGeom prst="rect">
+            <a:avLst/>
+          </a:prstGeom>
+          <a:solidFill>
+            <a:schemeClr val="accent2"/>
+          </a:solidFill>
+        </p:spPr>
+        <p:txBody>
+          <a:bodyPr wrap="square" rtlCol="0" anchor="ctr">
+            <a:noAutofit/>
+          </a:bodyPr>
+          <a:lstStyle/>
+          <a:p>
+            <a:pPr algn="ctr"/>
+            <a:r>
+              <a:rPr lang="en-US" dirty="0"/>
+              <a:t>USED</a:t>
+            </a:r>
+          </a:p>
+        </p:txBody>
+      </p:sp>
+      <p:pic>
+        <p:nvPicPr>
+          <p:cNvPr id="10" name="Picture 9">
+            <a:extLst>
+              <a:ext uri="{FF2B5EF4-FFF2-40B4-BE49-F238E27FC236}">
+                <a16:creationId xmlns:a16="http://schemas.microsoft.com/office/drawing/2014/main" id="{F408347A-60B2-426A-B5CD-F8F03DA04558}"/>
+              </a:ext>
+            </a:extLst>
+          </p:cNvPr>
+          <p:cNvPicPr>
+            <a:picLocks noChangeAspect="1"/>
+          </p:cNvPicPr>
+          <p:nvPr/>
+        </p:nvPicPr>
+        <p:blipFill>
+          <a:blip r:embed="rId2"/>
+          <a:stretch>
+            <a:fillRect/>
+          </a:stretch>
+        </p:blipFill>
+        <p:spPr>
+          <a:xfrm>
+            <a:off x="1845010" y="28105"/>
+            <a:ext cx="8670589" cy="6564373"/>
+          </a:xfrm>
+          <a:prstGeom prst="rect">
+            <a:avLst/>
+          </a:prstGeom>
+        </p:spPr>
+      </p:pic>
+    </p:spTree>
+    <p:extLst>
+      <p:ext uri="{BB962C8B-B14F-4D97-AF65-F5344CB8AC3E}">
+        <p14:creationId xmlns:p14="http://schemas.microsoft.com/office/powerpoint/2010/main" val="79097599"/>
       </p:ext>
     </p:extLst>
   </p:cSld>
@@ -19585,9 +19809,12 @@
 </file>
 
 <file path=customXml/item1.xml><?xml version="1.0" encoding="utf-8"?>
-<p:properties xmlns:p="http://schemas.microsoft.com/office/2006/metadata/properties" xmlns:xsi="http://www.w3.org/2001/XMLSchema-instance" xmlns:pc="http://schemas.microsoft.com/office/infopath/2007/PartnerControls">
-  <documentManagement/>
-</p:properties>
+<?mso-contentType ?>
+<FormTemplates xmlns="http://schemas.microsoft.com/sharepoint/v3/contenttype/forms">
+  <Display>DocumentLibraryForm</Display>
+  <Edit>DocumentLibraryForm</Edit>
+  <New>DocumentLibraryForm</New>
+</FormTemplates>
 </file>
 
 <file path=customXml/item2.xml><?xml version="1.0" encoding="utf-8"?>
@@ -19794,19 +20021,15 @@
 </file>
 
 <file path=customXml/item3.xml><?xml version="1.0" encoding="utf-8"?>
-<?mso-contentType ?>
-<FormTemplates xmlns="http://schemas.microsoft.com/sharepoint/v3/contenttype/forms">
-  <Display>DocumentLibraryForm</Display>
-  <Edit>DocumentLibraryForm</Edit>
-  <New>DocumentLibraryForm</New>
-</FormTemplates>
+<p:properties xmlns:p="http://schemas.microsoft.com/office/2006/metadata/properties" xmlns:xsi="http://www.w3.org/2001/XMLSchema-instance" xmlns:pc="http://schemas.microsoft.com/office/infopath/2007/PartnerControls">
+  <documentManagement/>
+</p:properties>
 </file>
 
 <file path=customXml/itemProps1.xml><?xml version="1.0" encoding="utf-8"?>
-<ds:datastoreItem xmlns:ds="http://schemas.openxmlformats.org/officeDocument/2006/customXml" ds:itemID="{DF638713-6AB8-4A66-BE29-296E582939C9}">
+<ds:datastoreItem xmlns:ds="http://schemas.openxmlformats.org/officeDocument/2006/customXml" ds:itemID="{F3D19EB7-EE39-4100-8C02-78B06972CA3A}">
   <ds:schemaRefs>
-    <ds:schemaRef ds:uri="http://schemas.microsoft.com/office/2006/metadata/properties"/>
-    <ds:schemaRef ds:uri="http://schemas.microsoft.com/office/infopath/2007/PartnerControls"/>
+    <ds:schemaRef ds:uri="http://schemas.microsoft.com/sharepoint/v3/contenttype/forms"/>
   </ds:schemaRefs>
 </ds:datastoreItem>
 </file>
@@ -19831,9 +20054,10 @@
 </file>
 
 <file path=customXml/itemProps3.xml><?xml version="1.0" encoding="utf-8"?>
-<ds:datastoreItem xmlns:ds="http://schemas.openxmlformats.org/officeDocument/2006/customXml" ds:itemID="{F3D19EB7-EE39-4100-8C02-78B06972CA3A}">
+<ds:datastoreItem xmlns:ds="http://schemas.openxmlformats.org/officeDocument/2006/customXml" ds:itemID="{DF638713-6AB8-4A66-BE29-296E582939C9}">
   <ds:schemaRefs>
-    <ds:schemaRef ds:uri="http://schemas.microsoft.com/sharepoint/v3/contenttype/forms"/>
+    <ds:schemaRef ds:uri="http://schemas.microsoft.com/office/2006/metadata/properties"/>
+    <ds:schemaRef ds:uri="http://schemas.microsoft.com/office/infopath/2007/PartnerControls"/>
   </ds:schemaRefs>
 </ds:datastoreItem>
 </file>
</xml_diff>